<commit_message>
Created AnalyseEnergy for doing E/p vs E fits
</commit_message>
<xml_diff>
--- a/IFG_FinalUncertainties.pptx
+++ b/IFG_FinalUncertainties.pptx
@@ -219,7 +219,7 @@
           <a:p>
             <a:fld id="{E18E715B-C4C6-FA44-89E6-29CE8E5147AD}" type="datetimeFigureOut">
               <a:rPr lang="en-US" smtClean="0"/>
-              <a:t>8/7/19</a:t>
+              <a:t>8/12/19</a:t>
             </a:fld>
             <a:endParaRPr lang="en-US"/>
           </a:p>
@@ -396,7 +396,7 @@
           <a:p>
             <a:fld id="{C9BEE1CD-6EDF-5C43-ACE9-942F6C137C3E}" type="datetimeFigureOut">
               <a:rPr lang="en-US" smtClean="0"/>
-              <a:t>8/7/19</a:t>
+              <a:t>8/12/19</a:t>
             </a:fld>
             <a:endParaRPr lang="en-US"/>
           </a:p>
@@ -4022,15 +4022,7 @@
           <a:p>
             <a:r>
               <a:rPr lang="en-US" sz="2800" dirty="0"/>
-              <a:t>	</a:t>
-            </a:r>
-            <a:r>
-              <a:rPr lang="en-US" sz="2800" dirty="0">
-                <a:highlight>
-                  <a:srgbClr val="FFFF00"/>
-                </a:highlight>
-              </a:rPr>
-              <a:t>|∆⍺|/⍺ = 45 ± 5% </a:t>
+              <a:t>	|∆⍺|/⍺ = 45 ± 5% </a:t>
             </a:r>
           </a:p>
           <a:p>
@@ -4099,10 +4091,10 @@
       </p:sp>
       <p:pic>
         <p:nvPicPr>
-          <p:cNvPr id="21" name="Picture 20" descr="A picture containing object, antenna&#10;&#10;Description automatically generated">
+          <p:cNvPr id="4" name="Picture 3" descr="A picture containing object&#10;&#10;Description automatically generated">
             <a:extLst>
               <a:ext uri="{FF2B5EF4-FFF2-40B4-BE49-F238E27FC236}">
-                <a16:creationId xmlns:a16="http://schemas.microsoft.com/office/drawing/2014/main" id="{B5A0DC1A-6CAB-734A-8646-EA459F98A975}"/>
+                <a16:creationId xmlns:a16="http://schemas.microsoft.com/office/drawing/2014/main" id="{8DE3E021-EA36-7247-B0C4-7DC64EFDAE66}"/>
               </a:ext>
             </a:extLst>
           </p:cNvPr>
@@ -4119,7 +4111,7 @@
         </p:blipFill>
         <p:spPr>
           <a:xfrm>
-            <a:off x="147268" y="1040097"/>
+            <a:off x="197536" y="1051627"/>
             <a:ext cx="4375497" cy="2880000"/>
           </a:xfrm>
           <a:prstGeom prst="rect">
@@ -4129,10 +4121,10 @@
       </p:pic>
       <p:pic>
         <p:nvPicPr>
-          <p:cNvPr id="23" name="Picture 22" descr="A picture containing object, antenna&#10;&#10;Description automatically generated">
+          <p:cNvPr id="6" name="Picture 5" descr="A screenshot of a social media post&#10;&#10;Description automatically generated">
             <a:extLst>
               <a:ext uri="{FF2B5EF4-FFF2-40B4-BE49-F238E27FC236}">
-                <a16:creationId xmlns:a16="http://schemas.microsoft.com/office/drawing/2014/main" id="{74304126-C298-C244-9D93-AA754EE936FF}"/>
+                <a16:creationId xmlns:a16="http://schemas.microsoft.com/office/drawing/2014/main" id="{3BC8F8EC-797F-1A43-8ADA-8EDFE45CECE2}"/>
               </a:ext>
             </a:extLst>
           </p:cNvPr>
@@ -4149,7 +4141,7 @@
         </p:blipFill>
         <p:spPr>
           <a:xfrm>
-            <a:off x="4567870" y="1020233"/>
+            <a:off x="4569935" y="1084799"/>
             <a:ext cx="4375497" cy="2880000"/>
           </a:xfrm>
           <a:prstGeom prst="rect">
@@ -4463,8 +4455,8 @@
           </a:p>
         </p:txBody>
       </p:sp>
-      <mc:AlternateContent xmlns:mc="http://schemas.openxmlformats.org/markup-compatibility/2006">
-        <mc:Choice xmlns:a14="http://schemas.microsoft.com/office/drawing/2010/main" Requires="a14">
+      <mc:AlternateContent xmlns:mc="http://schemas.openxmlformats.org/markup-compatibility/2006" xmlns:a14="http://schemas.microsoft.com/office/drawing/2010/main">
+        <mc:Choice Requires="a14">
           <p:sp>
             <p:nvSpPr>
               <p:cNvPr id="10" name="TextBox 9">
@@ -4530,7 +4522,7 @@
             </p:txBody>
           </p:sp>
         </mc:Choice>
-        <mc:Fallback>
+        <mc:Fallback xmlns="">
           <p:sp>
             <p:nvSpPr>
               <p:cNvPr id="10" name="TextBox 9">
@@ -4575,8 +4567,8 @@
           </p:sp>
         </mc:Fallback>
       </mc:AlternateContent>
-      <mc:AlternateContent xmlns:mc="http://schemas.openxmlformats.org/markup-compatibility/2006">
-        <mc:Choice xmlns:a14="http://schemas.microsoft.com/office/drawing/2010/main" Requires="a14">
+      <mc:AlternateContent xmlns:mc="http://schemas.openxmlformats.org/markup-compatibility/2006" xmlns:a14="http://schemas.microsoft.com/office/drawing/2010/main">
+        <mc:Choice Requires="a14">
           <p:sp>
             <p:nvSpPr>
               <p:cNvPr id="14" name="TextBox 13">
@@ -4763,6 +4755,7 @@
                 </a:endParaRPr>
               </a:p>
               <a:p>
+                <a:pPr/>
                 <a14:m>
                   <m:oMathPara xmlns:m="http://schemas.openxmlformats.org/officeDocument/2006/math">
                     <m:oMathParaPr>
@@ -4965,7 +4958,7 @@
             </p:txBody>
           </p:sp>
         </mc:Choice>
-        <mc:Fallback>
+        <mc:Fallback xmlns="">
           <p:sp>
             <p:nvSpPr>
               <p:cNvPr id="14" name="TextBox 13">

</xml_diff>

<commit_message>
Fixed the pull plots
</commit_message>
<xml_diff>
--- a/IFG_FinalUncertainties.pptx
+++ b/IFG_FinalUncertainties.pptx
@@ -219,7 +219,7 @@
           <a:p>
             <a:fld id="{E18E715B-C4C6-FA44-89E6-29CE8E5147AD}" type="datetimeFigureOut">
               <a:rPr lang="en-US" smtClean="0"/>
-              <a:t>8/12/19</a:t>
+              <a:t>8/14/19</a:t>
             </a:fld>
             <a:endParaRPr lang="en-US"/>
           </a:p>
@@ -396,7 +396,7 @@
           <a:p>
             <a:fld id="{C9BEE1CD-6EDF-5C43-ACE9-942F6C137C3E}" type="datetimeFigureOut">
               <a:rPr lang="en-US" smtClean="0"/>
-              <a:t>8/12/19</a:t>
+              <a:t>8/14/19</a:t>
             </a:fld>
             <a:endParaRPr lang="en-US"/>
           </a:p>
@@ -4567,8 +4567,8 @@
           </p:sp>
         </mc:Fallback>
       </mc:AlternateContent>
-      <mc:AlternateContent xmlns:mc="http://schemas.openxmlformats.org/markup-compatibility/2006" xmlns:a14="http://schemas.microsoft.com/office/drawing/2010/main">
-        <mc:Choice Requires="a14">
+      <mc:AlternateContent xmlns:mc="http://schemas.openxmlformats.org/markup-compatibility/2006">
+        <mc:Choice xmlns:a14="http://schemas.microsoft.com/office/drawing/2010/main" Requires="a14">
           <p:sp>
             <p:nvSpPr>
               <p:cNvPr id="14" name="TextBox 13">
@@ -4583,7 +4583,7 @@
             </p:nvSpPr>
             <p:spPr>
               <a:xfrm>
-                <a:off x="3603175" y="1322099"/>
+                <a:off x="3127723" y="1292357"/>
                 <a:ext cx="6565583" cy="3595408"/>
               </a:xfrm>
               <a:prstGeom prst="rect">
@@ -4684,6 +4684,15 @@
                 <a14:m>
                   <m:oMath xmlns:m="http://schemas.openxmlformats.org/officeDocument/2006/math">
                     <m:r>
+                      <a:rPr lang="en-GB" sz="2400" b="0" i="0" smtClean="0">
+                        <a:solidFill>
+                          <a:schemeClr val="tx1"/>
+                        </a:solidFill>
+                        <a:latin typeface="Cambria Math" panose="02040503050406030204" pitchFamily="18" charset="0"/>
+                      </a:rPr>
+                      <m:t>(</m:t>
+                    </m:r>
+                    <m:r>
                       <a:rPr lang="en-GB" sz="2400" b="0" i="1" smtClean="0">
                         <a:solidFill>
                           <a:schemeClr val="tx1"/>
@@ -4691,6 +4700,20 @@
                         <a:latin typeface="Cambria Math" panose="02040503050406030204" pitchFamily="18" charset="0"/>
                       </a:rPr>
                       <m:t>0.1263</m:t>
+                    </m:r>
+                    <m:r>
+                      <a:rPr lang="en-GB" sz="2400" i="1">
+                        <a:latin typeface="Cambria Math" panose="02040503050406030204" pitchFamily="18" charset="0"/>
+                        <a:ea typeface="Cambria Math" panose="02040503050406030204" pitchFamily="18" charset="0"/>
+                      </a:rPr>
+                      <m:t>±</m:t>
+                    </m:r>
+                    <m:r>
+                      <a:rPr lang="en-GB" sz="2400" b="0" i="1" smtClean="0">
+                        <a:latin typeface="Cambria Math" panose="02040503050406030204" pitchFamily="18" charset="0"/>
+                        <a:ea typeface="Cambria Math" panose="02040503050406030204" pitchFamily="18" charset="0"/>
+                      </a:rPr>
+                      <m:t>0.6888)</m:t>
                     </m:r>
                     <m:r>
                       <a:rPr lang="en-GB" sz="2400" b="0" i="1" smtClean="0">
@@ -4776,10 +4799,39 @@
                           <a:solidFill>
                             <a:schemeClr val="tx1"/>
                           </a:solidFill>
+                          <a:highlight>
+                            <a:srgbClr val="FFFF00"/>
+                          </a:highlight>
                           <a:latin typeface="Cambria Math" panose="02040503050406030204" pitchFamily="18" charset="0"/>
                           <a:ea typeface="Cambria Math" panose="02040503050406030204" pitchFamily="18" charset="0"/>
                         </a:rPr>
-                        <m:t>±0.005 </m:t>
+                        <m:t>±0.</m:t>
+                      </m:r>
+                      <m:r>
+                        <a:rPr lang="en-GB" sz="2400" b="0" i="1" smtClean="0">
+                          <a:solidFill>
+                            <a:schemeClr val="tx1"/>
+                          </a:solidFill>
+                          <a:highlight>
+                            <a:srgbClr val="FFFF00"/>
+                          </a:highlight>
+                          <a:latin typeface="Cambria Math" panose="02040503050406030204" pitchFamily="18" charset="0"/>
+                          <a:ea typeface="Cambria Math" panose="02040503050406030204" pitchFamily="18" charset="0"/>
+                        </a:rPr>
+                        <m:t>312</m:t>
+                      </m:r>
+                      <m:r>
+                        <a:rPr lang="en-GB" sz="2400" b="0" i="1" smtClean="0">
+                          <a:solidFill>
+                            <a:schemeClr val="tx1"/>
+                          </a:solidFill>
+                          <a:highlight>
+                            <a:srgbClr val="FFFF00"/>
+                          </a:highlight>
+                          <a:latin typeface="Cambria Math" panose="02040503050406030204" pitchFamily="18" charset="0"/>
+                          <a:ea typeface="Cambria Math" panose="02040503050406030204" pitchFamily="18" charset="0"/>
+                        </a:rPr>
+                        <m:t> </m:t>
                       </m:r>
                       <m:r>
                         <a:rPr lang="en-GB" sz="2400" b="0" i="1" smtClean="0">
@@ -4857,26 +4909,6 @@
                         <a:ea typeface="Cambria Math" panose="02040503050406030204" pitchFamily="18" charset="0"/>
                       </a:rPr>
                       <m:t>𝟓𝟕</m:t>
-                    </m:r>
-                    <m:r>
-                      <a:rPr lang="en-GB" sz="2400" b="1" i="1">
-                        <a:solidFill>
-                          <a:schemeClr val="tx1"/>
-                        </a:solidFill>
-                        <a:latin typeface="Cambria Math" panose="02040503050406030204" pitchFamily="18" charset="0"/>
-                        <a:ea typeface="Cambria Math" panose="02040503050406030204" pitchFamily="18" charset="0"/>
-                      </a:rPr>
-                      <m:t>±</m:t>
-                    </m:r>
-                    <m:r>
-                      <a:rPr lang="en-GB" sz="2400" b="1" i="1" smtClean="0">
-                        <a:solidFill>
-                          <a:schemeClr val="tx1"/>
-                        </a:solidFill>
-                        <a:latin typeface="Cambria Math" panose="02040503050406030204" pitchFamily="18" charset="0"/>
-                        <a:ea typeface="Cambria Math" panose="02040503050406030204" pitchFamily="18" charset="0"/>
-                      </a:rPr>
-                      <m:t>𝟓</m:t>
                     </m:r>
                     <m:r>
                       <a:rPr lang="en-GB" sz="2400" b="1" i="1" smtClean="0">
@@ -4958,7 +4990,7 @@
             </p:txBody>
           </p:sp>
         </mc:Choice>
-        <mc:Fallback xmlns="">
+        <mc:Fallback>
           <p:sp>
             <p:nvSpPr>
               <p:cNvPr id="14" name="TextBox 13">
@@ -4975,7 +5007,7 @@
             </p:nvSpPr>
             <p:spPr>
               <a:xfrm>
-                <a:off x="3603175" y="1322099"/>
+                <a:off x="3127723" y="1292357"/>
                 <a:ext cx="6565583" cy="3595408"/>
               </a:xfrm>
               <a:prstGeom prst="rect">
@@ -5025,7 +5057,7 @@
         </p:blipFill>
         <p:spPr>
           <a:xfrm rot="5400000">
-            <a:off x="692815" y="581872"/>
+            <a:off x="659216" y="581872"/>
             <a:ext cx="2811681" cy="4130112"/>
           </a:xfrm>
           <a:prstGeom prst="rect">
@@ -5105,9 +5137,8 @@
             </a:pPr>
             <a:r>
               <a:rPr lang="en-GB" sz="2400" b="0" dirty="0"/>
-              <a:t>This is obviously well above the 20 ppb allowed for gain fluctuations.</a:t>
+              <a:t>The error on the error is so large the result is meaningless. </a:t>
             </a:r>
-            <a:endParaRPr lang="en-US" sz="2400" b="0" dirty="0"/>
           </a:p>
           <a:p>
             <a:pPr marL="0" indent="0">
@@ -5121,7 +5152,7 @@
             </a:pPr>
             <a:r>
               <a:rPr lang="en-US" sz="2400" b="0" dirty="0"/>
-              <a:t>I would take this result with a pinch of salt, I mostly just wanted to see what I get out. </a:t>
+              <a:t>Does it make sense to get an error on the error</a:t>
             </a:r>
           </a:p>
           <a:p>
@@ -5136,10 +5167,19 @@
             </a:pPr>
             <a:r>
               <a:rPr lang="en-US" sz="2400" b="0" dirty="0"/>
-              <a:t>I’d guess that things would improve with more tracks </a:t>
+              <a:t>How does the IFG multiplier work?</a:t>
             </a:r>
           </a:p>
           <a:p>
+            <a:pPr marL="0" indent="0">
+              <a:buNone/>
+            </a:pPr>
+            <a:endParaRPr lang="en-US" sz="2400" b="0" dirty="0"/>
+          </a:p>
+          <a:p>
+            <a:pPr marL="0" indent="0">
+              <a:buNone/>
+            </a:pPr>
             <a:endParaRPr lang="en-US" sz="2400" b="0" dirty="0"/>
           </a:p>
           <a:p>
@@ -5378,46 +5418,8 @@
                   <a:schemeClr val="bg1"/>
                 </a:solidFill>
               </a:rPr>
-              <a:t>Conclusion</a:t>
+              <a:t>End</a:t>
             </a:r>
-          </a:p>
-        </p:txBody>
-      </p:sp>
-      <p:sp>
-        <p:nvSpPr>
-          <p:cNvPr id="14" name="TextBox 13">
-            <a:extLst>
-              <a:ext uri="{FF2B5EF4-FFF2-40B4-BE49-F238E27FC236}">
-                <a16:creationId xmlns:a16="http://schemas.microsoft.com/office/drawing/2014/main" id="{6A9981EF-DB2B-9F4B-81C1-B26EC99D726D}"/>
-              </a:ext>
-            </a:extLst>
-          </p:cNvPr>
-          <p:cNvSpPr txBox="1"/>
-          <p:nvPr/>
-        </p:nvSpPr>
-        <p:spPr>
-          <a:xfrm>
-            <a:off x="595882" y="4152321"/>
-            <a:ext cx="8412659" cy="923330"/>
-          </a:xfrm>
-          <a:prstGeom prst="rect">
-            <a:avLst/>
-          </a:prstGeom>
-          <a:noFill/>
-        </p:spPr>
-        <p:txBody>
-          <a:bodyPr wrap="square" rtlCol="0">
-            <a:spAutoFit/>
-          </a:bodyPr>
-          <a:lstStyle/>
-          <a:p>
-            <a:endParaRPr lang="en-US" dirty="0"/>
-          </a:p>
-          <a:p>
-            <a:endParaRPr lang="en-US" dirty="0"/>
-          </a:p>
-          <a:p>
-            <a:endParaRPr lang="en-US" dirty="0"/>
           </a:p>
         </p:txBody>
       </p:sp>

</xml_diff>